<commit_message>
read.csv issue fix, no more renaming psytoolkit output
weird bugs appeared that required hours of fixing
improved robustness of code in many places
hopefully fixed that no more empty cogntiive tests are in the output
removed need to rename psytoolkit download
some surgical indivudal vpid fixes
currently still running into issues because of type mismatches between questionnaires...
</commit_message>
<xml_diff>
--- a/information/What's in the Backbone.pptx
+++ b/information/What's in the Backbone.pptx
@@ -7,8 +7,9 @@
   <p:sldIdLst>
     <p:sldId id="256" r:id="rId2"/>
     <p:sldId id="257" r:id="rId3"/>
-    <p:sldId id="258" r:id="rId4"/>
-    <p:sldId id="259" r:id="rId5"/>
+    <p:sldId id="260" r:id="rId4"/>
+    <p:sldId id="258" r:id="rId5"/>
+    <p:sldId id="259" r:id="rId6"/>
   </p:sldIdLst>
   <p:sldSz cx="12192000" cy="6858000"/>
   <p:notesSz cx="6858000" cy="9144000"/>
@@ -262,7 +263,7 @@
           <a:p>
             <a:fld id="{DC3464DE-BB09-4046-9914-AAE77AD20AD3}" type="datetimeFigureOut">
               <a:rPr lang="de-DE" smtClean="0"/>
-              <a:t>29.09.2025</a:t>
+              <a:t>08.12.2025</a:t>
             </a:fld>
             <a:endParaRPr lang="de-DE"/>
           </a:p>
@@ -460,7 +461,7 @@
           <a:p>
             <a:fld id="{DC3464DE-BB09-4046-9914-AAE77AD20AD3}" type="datetimeFigureOut">
               <a:rPr lang="de-DE" smtClean="0"/>
-              <a:t>29.09.2025</a:t>
+              <a:t>08.12.2025</a:t>
             </a:fld>
             <a:endParaRPr lang="de-DE"/>
           </a:p>
@@ -668,7 +669,7 @@
           <a:p>
             <a:fld id="{DC3464DE-BB09-4046-9914-AAE77AD20AD3}" type="datetimeFigureOut">
               <a:rPr lang="de-DE" smtClean="0"/>
-              <a:t>29.09.2025</a:t>
+              <a:t>08.12.2025</a:t>
             </a:fld>
             <a:endParaRPr lang="de-DE"/>
           </a:p>
@@ -866,7 +867,7 @@
           <a:p>
             <a:fld id="{DC3464DE-BB09-4046-9914-AAE77AD20AD3}" type="datetimeFigureOut">
               <a:rPr lang="de-DE" smtClean="0"/>
-              <a:t>29.09.2025</a:t>
+              <a:t>08.12.2025</a:t>
             </a:fld>
             <a:endParaRPr lang="de-DE"/>
           </a:p>
@@ -1141,7 +1142,7 @@
           <a:p>
             <a:fld id="{DC3464DE-BB09-4046-9914-AAE77AD20AD3}" type="datetimeFigureOut">
               <a:rPr lang="de-DE" smtClean="0"/>
-              <a:t>29.09.2025</a:t>
+              <a:t>08.12.2025</a:t>
             </a:fld>
             <a:endParaRPr lang="de-DE"/>
           </a:p>
@@ -1406,7 +1407,7 @@
           <a:p>
             <a:fld id="{DC3464DE-BB09-4046-9914-AAE77AD20AD3}" type="datetimeFigureOut">
               <a:rPr lang="de-DE" smtClean="0"/>
-              <a:t>29.09.2025</a:t>
+              <a:t>08.12.2025</a:t>
             </a:fld>
             <a:endParaRPr lang="de-DE"/>
           </a:p>
@@ -1818,7 +1819,7 @@
           <a:p>
             <a:fld id="{DC3464DE-BB09-4046-9914-AAE77AD20AD3}" type="datetimeFigureOut">
               <a:rPr lang="de-DE" smtClean="0"/>
-              <a:t>29.09.2025</a:t>
+              <a:t>08.12.2025</a:t>
             </a:fld>
             <a:endParaRPr lang="de-DE"/>
           </a:p>
@@ -1959,7 +1960,7 @@
           <a:p>
             <a:fld id="{DC3464DE-BB09-4046-9914-AAE77AD20AD3}" type="datetimeFigureOut">
               <a:rPr lang="de-DE" smtClean="0"/>
-              <a:t>29.09.2025</a:t>
+              <a:t>08.12.2025</a:t>
             </a:fld>
             <a:endParaRPr lang="de-DE"/>
           </a:p>
@@ -2072,7 +2073,7 @@
           <a:p>
             <a:fld id="{DC3464DE-BB09-4046-9914-AAE77AD20AD3}" type="datetimeFigureOut">
               <a:rPr lang="de-DE" smtClean="0"/>
-              <a:t>29.09.2025</a:t>
+              <a:t>08.12.2025</a:t>
             </a:fld>
             <a:endParaRPr lang="de-DE"/>
           </a:p>
@@ -2383,7 +2384,7 @@
           <a:p>
             <a:fld id="{DC3464DE-BB09-4046-9914-AAE77AD20AD3}" type="datetimeFigureOut">
               <a:rPr lang="de-DE" smtClean="0"/>
-              <a:t>29.09.2025</a:t>
+              <a:t>08.12.2025</a:t>
             </a:fld>
             <a:endParaRPr lang="de-DE"/>
           </a:p>
@@ -2671,7 +2672,7 @@
           <a:p>
             <a:fld id="{DC3464DE-BB09-4046-9914-AAE77AD20AD3}" type="datetimeFigureOut">
               <a:rPr lang="de-DE" smtClean="0"/>
-              <a:t>29.09.2025</a:t>
+              <a:t>08.12.2025</a:t>
             </a:fld>
             <a:endParaRPr lang="de-DE"/>
           </a:p>
@@ -2912,7 +2913,7 @@
           <a:p>
             <a:fld id="{DC3464DE-BB09-4046-9914-AAE77AD20AD3}" type="datetimeFigureOut">
               <a:rPr lang="de-DE" smtClean="0"/>
-              <a:t>29.09.2025</a:t>
+              <a:t>08.12.2025</a:t>
             </a:fld>
             <a:endParaRPr lang="de-DE"/>
           </a:p>
@@ -3810,6 +3811,144 @@
           <a:chExt cx="0" cy="0"/>
         </a:xfrm>
       </p:grpSpPr>
+      <p:sp>
+        <p:nvSpPr>
+          <p:cNvPr id="2" name="Titel 1">
+            <a:extLst>
+              <a:ext uri="{FF2B5EF4-FFF2-40B4-BE49-F238E27FC236}">
+                <a16:creationId xmlns:a16="http://schemas.microsoft.com/office/drawing/2014/main" id="{CC043554-757B-4723-84DF-3B87DE873CC2}"/>
+              </a:ext>
+            </a:extLst>
+          </p:cNvPr>
+          <p:cNvSpPr>
+            <a:spLocks noGrp="1"/>
+          </p:cNvSpPr>
+          <p:nvPr>
+            <p:ph type="title"/>
+          </p:nvPr>
+        </p:nvSpPr>
+        <p:spPr>
+          <a:xfrm>
+            <a:off x="838200" y="-100543"/>
+            <a:ext cx="10515600" cy="1325563"/>
+          </a:xfrm>
+        </p:spPr>
+        <p:txBody>
+          <a:bodyPr/>
+          <a:lstStyle/>
+          <a:p>
+            <a:r>
+              <a:rPr lang="de-DE" dirty="0" err="1"/>
+              <a:t>Adolescents</a:t>
+            </a:r>
+            <a:r>
+              <a:rPr lang="de-DE" dirty="0"/>
+              <a:t> </a:t>
+            </a:r>
+            <a:r>
+              <a:rPr lang="de-DE" dirty="0" err="1"/>
+              <a:t>Questionnaire</a:t>
+            </a:r>
+            <a:endParaRPr lang="de-DE" dirty="0"/>
+          </a:p>
+        </p:txBody>
+      </p:sp>
+      <p:sp>
+        <p:nvSpPr>
+          <p:cNvPr id="3" name="Inhaltsplatzhalter 2">
+            <a:extLst>
+              <a:ext uri="{FF2B5EF4-FFF2-40B4-BE49-F238E27FC236}">
+                <a16:creationId xmlns:a16="http://schemas.microsoft.com/office/drawing/2014/main" id="{7F04A898-4CCF-47A0-B1D1-AD6B8D471CC7}"/>
+              </a:ext>
+            </a:extLst>
+          </p:cNvPr>
+          <p:cNvSpPr>
+            <a:spLocks noGrp="1"/>
+          </p:cNvSpPr>
+          <p:nvPr>
+            <p:ph idx="1"/>
+          </p:nvPr>
+        </p:nvSpPr>
+        <p:spPr>
+          <a:xfrm>
+            <a:off x="5926666" y="1605491"/>
+            <a:ext cx="5300133" cy="4351338"/>
+          </a:xfrm>
+        </p:spPr>
+        <p:txBody>
+          <a:bodyPr/>
+          <a:lstStyle/>
+          <a:p>
+            <a:pPr marL="0" indent="0">
+              <a:buNone/>
+            </a:pPr>
+            <a:r>
+              <a:rPr lang="de-DE"/>
+              <a:t>same</a:t>
+            </a:r>
+          </a:p>
+        </p:txBody>
+      </p:sp>
+      <p:pic>
+        <p:nvPicPr>
+          <p:cNvPr id="7" name="Grafik 6">
+            <a:extLst>
+              <a:ext uri="{FF2B5EF4-FFF2-40B4-BE49-F238E27FC236}">
+                <a16:creationId xmlns:a16="http://schemas.microsoft.com/office/drawing/2014/main" id="{EE306C13-1241-4652-B377-C281F0FBD6E1}"/>
+              </a:ext>
+            </a:extLst>
+          </p:cNvPr>
+          <p:cNvPicPr>
+            <a:picLocks noChangeAspect="1"/>
+          </p:cNvPicPr>
+          <p:nvPr/>
+        </p:nvPicPr>
+        <p:blipFill>
+          <a:blip r:embed="rId2"/>
+          <a:stretch>
+            <a:fillRect/>
+          </a:stretch>
+        </p:blipFill>
+        <p:spPr>
+          <a:xfrm>
+            <a:off x="965201" y="778933"/>
+            <a:ext cx="2444072" cy="5562600"/>
+          </a:xfrm>
+          <a:prstGeom prst="rect">
+            <a:avLst/>
+          </a:prstGeom>
+        </p:spPr>
+      </p:pic>
+    </p:spTree>
+    <p:extLst>
+      <p:ext uri="{BB962C8B-B14F-4D97-AF65-F5344CB8AC3E}">
+        <p14:creationId xmlns:p14="http://schemas.microsoft.com/office/powerpoint/2010/main" val="2059663016"/>
+      </p:ext>
+    </p:extLst>
+  </p:cSld>
+  <p:clrMapOvr>
+    <a:masterClrMapping/>
+  </p:clrMapOvr>
+</p:sld>
+</file>
+
+<file path=ppt/slides/slide4.xml><?xml version="1.0" encoding="utf-8"?>
+<p:sld xmlns:a="http://schemas.openxmlformats.org/drawingml/2006/main" xmlns:r="http://schemas.openxmlformats.org/officeDocument/2006/relationships" xmlns:p="http://schemas.openxmlformats.org/presentationml/2006/main">
+  <p:cSld>
+    <p:spTree>
+      <p:nvGrpSpPr>
+        <p:cNvPr id="1" name=""/>
+        <p:cNvGrpSpPr/>
+        <p:nvPr/>
+      </p:nvGrpSpPr>
+      <p:grpSpPr>
+        <a:xfrm>
+          <a:off x="0" y="0"/>
+          <a:ext cx="0" cy="0"/>
+          <a:chOff x="0" y="0"/>
+          <a:chExt cx="0" cy="0"/>
+        </a:xfrm>
+      </p:grpSpPr>
       <p:pic>
         <p:nvPicPr>
           <p:cNvPr id="4" name="Grafik 3">
@@ -4281,7 +4420,7 @@
 </p:sld>
 </file>
 
-<file path=ppt/slides/slide4.xml><?xml version="1.0" encoding="utf-8"?>
+<file path=ppt/slides/slide5.xml><?xml version="1.0" encoding="utf-8"?>
 <p:sld xmlns:a="http://schemas.openxmlformats.org/drawingml/2006/main" xmlns:r="http://schemas.openxmlformats.org/officeDocument/2006/relationships" xmlns:p="http://schemas.openxmlformats.org/presentationml/2006/main">
   <p:cSld>
     <p:spTree>

</xml_diff>